<commit_message>
updated exam slides to remove Leonore email
</commit_message>
<xml_diff>
--- a/assets/pptx/exam_R.pptx
+++ b/assets/pptx/exam_R.pptx
@@ -119,6 +119,14 @@
 </p:presentation>
 </file>
 
+<file path=ppt/revisionInfo.xml><?xml version="1.0" encoding="utf-8"?>
+<p1510:revInfo xmlns:a="http://schemas.openxmlformats.org/drawingml/2006/main" xmlns:r="http://schemas.openxmlformats.org/officeDocument/2006/relationships" xmlns:p1510="http://schemas.microsoft.com/office/powerpoint/2015/10/main">
+  <p1510:revLst>
+    <p1510:client id="{D2AD5DB3-4FF5-E6FB-ADD3-E12E35D32980}" v="35" dt="2022-10-13T09:11:51.348"/>
+  </p1510:revLst>
+</p1510:revInfo>
+</file>
+
 <file path=ppt/notesMasters/notesMaster1.xml><?xml version="1.0" encoding="utf-8"?>
 <p:notesMaster xmlns:a="http://schemas.openxmlformats.org/drawingml/2006/main" xmlns:r="http://schemas.openxmlformats.org/officeDocument/2006/relationships" xmlns:p="http://schemas.openxmlformats.org/presentationml/2006/main">
   <p:cSld>
@@ -467,7 +475,7 @@
         <p:spPr>
           <a:xfrm>
             <a:off x="1371600" y="1143000"/>
-            <a:ext cx="4109400" cy="3080880"/>
+            <a:ext cx="4110038" cy="3081338"/>
           </a:xfrm>
           <a:prstGeom prst="rect">
             <a:avLst/>
@@ -4604,7 +4612,7 @@
           <a:fontRef idx="minor"/>
         </p:style>
         <p:txBody>
-          <a:bodyPr lIns="90000" tIns="45000" rIns="90000" bIns="45000">
+          <a:bodyPr lIns="90000" tIns="45000" rIns="90000" bIns="45000" anchor="t">
             <a:normAutofit fontScale="85000" lnSpcReduction="20000"/>
           </a:bodyPr>
           <a:lstStyle/>
@@ -4622,9 +4630,9 @@
                 <a:solidFill>
                   <a:srgbClr val="262626"/>
                 </a:solidFill>
-                <a:latin typeface="Calibri" panose="020F0502020204030204" pitchFamily="34" charset="0"/>
+                <a:latin typeface="Calibri"/>
                 <a:ea typeface="DejaVu Sans"/>
-                <a:cs typeface="Calibri" panose="020F0502020204030204" pitchFamily="34" charset="0"/>
+                <a:cs typeface="Calibri"/>
               </a:rPr>
               <a:t>Data: </a:t>
             </a:r>
@@ -4633,9 +4641,9 @@
                 <a:solidFill>
                   <a:srgbClr val="262626"/>
                 </a:solidFill>
-                <a:latin typeface="Calibri" panose="020F0502020204030204" pitchFamily="34" charset="0"/>
+                <a:latin typeface="Calibri"/>
                 <a:ea typeface="DejaVu Sans"/>
-                <a:cs typeface="Calibri" panose="020F0502020204030204" pitchFamily="34" charset="0"/>
+                <a:cs typeface="Calibri"/>
               </a:rPr>
               <a:t>A set of data collected from students at the University of Lausanne is available in the file </a:t>
             </a:r>
@@ -4644,9 +4652,9 @@
                 <a:solidFill>
                   <a:srgbClr val="000000"/>
                 </a:solidFill>
-                <a:latin typeface="Calibri" panose="020F0502020204030204" pitchFamily="34" charset="0"/>
+                <a:latin typeface="Calibri"/>
                 <a:ea typeface="DejaVu Sans"/>
-                <a:cs typeface="Calibri" panose="020F0502020204030204" pitchFamily="34" charset="0"/>
+                <a:cs typeface="Calibri"/>
               </a:rPr>
               <a:t>etubiol.csv</a:t>
             </a:r>
@@ -4655,44 +4663,22 @@
                 <a:solidFill>
                   <a:srgbClr val="000000"/>
                 </a:solidFill>
-                <a:latin typeface="Calibri" panose="020F0502020204030204" pitchFamily="34" charset="0"/>
+                <a:latin typeface="Calibri"/>
                 <a:ea typeface="DejaVu Sans"/>
-                <a:cs typeface="Calibri" panose="020F0502020204030204" pitchFamily="34" charset="0"/>
-              </a:rPr>
-              <a:t> (courtesy of F. </a:t>
-            </a:r>
-            <a:r>
-              <a:rPr lang="en-US" sz="2200" b="0" strike="noStrike" spc="-1" dirty="0" err="1">
-                <a:solidFill>
-                  <a:srgbClr val="000000"/>
-                </a:solidFill>
-                <a:latin typeface="Calibri" panose="020F0502020204030204" pitchFamily="34" charset="0"/>
-                <a:ea typeface="DejaVu Sans"/>
-                <a:cs typeface="Calibri" panose="020F0502020204030204" pitchFamily="34" charset="0"/>
-              </a:rPr>
-              <a:t>Schütz</a:t>
-            </a:r>
-            <a:r>
-              <a:rPr lang="en-US" sz="2200" b="0" strike="noStrike" spc="-1" dirty="0">
-                <a:solidFill>
-                  <a:srgbClr val="000000"/>
-                </a:solidFill>
-                <a:latin typeface="Calibri" panose="020F0502020204030204" pitchFamily="34" charset="0"/>
-                <a:ea typeface="DejaVu Sans"/>
-                <a:cs typeface="Calibri" panose="020F0502020204030204" pitchFamily="34" charset="0"/>
-              </a:rPr>
-              <a:t>).</a:t>
-            </a:r>
-            <a:r>
-              <a:rPr lang="en-US" sz="2200" b="0" strike="noStrike" spc="-1" dirty="0">
+                <a:cs typeface="Calibri"/>
+              </a:rPr>
+              <a:t> (courtesy of F. Schütz).</a:t>
+            </a:r>
+            <a:r>
+              <a:rPr lang="en-US" sz="2200" spc="-1" dirty="0">
                 <a:solidFill>
                   <a:srgbClr val="FF0000"/>
                 </a:solidFill>
-                <a:latin typeface="Calibri" panose="020F0502020204030204" pitchFamily="34" charset="0"/>
+                <a:latin typeface="Calibri"/>
                 <a:ea typeface="DejaVu Sans"/>
-                <a:cs typeface="Calibri" panose="020F0502020204030204" pitchFamily="34" charset="0"/>
-              </a:rPr>
-              <a:t> </a:t>
+                <a:cs typeface="Calibri"/>
+              </a:rPr>
+              <a:t> </a:t>
             </a:r>
             <a:endParaRPr lang="en-US" sz="2200" b="0" strike="noStrike" spc="-1" dirty="0">
               <a:latin typeface="Calibri" panose="020F0502020204030204" pitchFamily="34" charset="0"/>
@@ -4800,7 +4786,7 @@
             </a:endParaRPr>
           </a:p>
           <a:p>
-            <a:pPr marL="460080" lvl="2" indent="-226440">
+            <a:pPr marL="459740" lvl="2" indent="-226060">
               <a:lnSpc>
                 <a:spcPct val="90000"/>
               </a:lnSpc>
@@ -4830,7 +4816,7 @@
             </a:endParaRPr>
           </a:p>
           <a:p>
-            <a:pPr marL="460080" lvl="2" indent="-226440">
+            <a:pPr marL="459740" lvl="2" indent="-226060">
               <a:lnSpc>
                 <a:spcPct val="90000"/>
               </a:lnSpc>
@@ -4860,7 +4846,7 @@
             </a:endParaRPr>
           </a:p>
           <a:p>
-            <a:pPr marL="460080" lvl="2" indent="-226440">
+            <a:pPr marL="459740" lvl="2" indent="-226060">
               <a:lnSpc>
                 <a:spcPct val="90000"/>
               </a:lnSpc>
@@ -4904,7 +4890,7 @@
             </a:endParaRPr>
           </a:p>
           <a:p>
-            <a:pPr marL="723960" lvl="1" indent="-261720">
+            <a:pPr marL="723900" lvl="1" indent="-261620">
               <a:lnSpc>
                 <a:spcPct val="90000"/>
               </a:lnSpc>
@@ -4922,47 +4908,36 @@
                 <a:solidFill>
                   <a:srgbClr val="262626"/>
                 </a:solidFill>
-                <a:latin typeface="Calibri" panose="020F0502020204030204" pitchFamily="34" charset="0"/>
+                <a:latin typeface="Calibri"/>
                 <a:ea typeface="DejaVu Sans"/>
-                <a:cs typeface="Calibri" panose="020F0502020204030204" pitchFamily="34" charset="0"/>
-              </a:rPr>
-              <a:t>Submit analysis by e-mail to  </a:t>
-            </a:r>
-            <a:r>
-              <a:rPr lang="en-US" sz="2200" b="0" strike="noStrike" spc="-1" dirty="0" err="1">
-                <a:solidFill>
-                  <a:srgbClr val="262626"/>
-                </a:solidFill>
-                <a:latin typeface="Calibri" panose="020F0502020204030204" pitchFamily="34" charset="0"/>
-                <a:ea typeface="DejaVu Sans"/>
-                <a:cs typeface="Calibri" panose="020F0502020204030204" pitchFamily="34" charset="0"/>
-              </a:rPr>
-              <a:t>Leonore.wigger@sib.swiss</a:t>
-            </a:r>
-            <a:r>
-              <a:rPr lang="en-US" sz="2200" b="0" strike="noStrike" spc="-1" dirty="0">
-                <a:solidFill>
-                  <a:srgbClr val="262626"/>
-                </a:solidFill>
-                <a:latin typeface="Calibri" panose="020F0502020204030204" pitchFamily="34" charset="0"/>
-                <a:ea typeface="DejaVu Sans"/>
-                <a:cs typeface="Calibri" panose="020F0502020204030204" pitchFamily="34" charset="0"/>
-              </a:rPr>
-              <a:t> </a:t>
+                <a:cs typeface="Calibri"/>
+              </a:rPr>
+              <a:t>Submit analysis by e-mail to</a:t>
             </a:r>
             <a:r>
               <a:rPr lang="en-US" sz="2200" spc="-1" dirty="0">
                 <a:solidFill>
                   <a:srgbClr val="262626"/>
                 </a:solidFill>
-                <a:latin typeface="Calibri" panose="020F0502020204030204" pitchFamily="34" charset="0"/>
-                <a:cs typeface="Calibri" panose="020F0502020204030204" pitchFamily="34" charset="0"/>
-              </a:rPr>
-              <a:t>by June 16,2022, 23:59:59.</a:t>
-            </a:r>
-          </a:p>
-          <a:p>
-            <a:pPr marL="723960" lvl="1" indent="-261720">
+                <a:latin typeface="Calibri"/>
+                <a:ea typeface="DejaVu Sans"/>
+                <a:cs typeface="Calibri"/>
+              </a:rPr>
+              <a:t> </a:t>
+            </a:r>
+            <a:r>
+              <a:rPr lang="en-US" sz="2200" spc="-1" dirty="0">
+                <a:solidFill>
+                  <a:srgbClr val="262626"/>
+                </a:solidFill>
+                <a:latin typeface="Calibri"/>
+                <a:cs typeface="Calibri"/>
+              </a:rPr>
+              <a:t> the trainer, at the latest 1 week after the course.</a:t>
+            </a:r>
+          </a:p>
+          <a:p>
+            <a:pPr marL="723900" lvl="1" indent="-261620">
               <a:lnSpc>
                 <a:spcPct val="90000"/>
               </a:lnSpc>
@@ -5000,7 +4975,7 @@
             </a:endParaRPr>
           </a:p>
           <a:p>
-            <a:pPr marL="723960" lvl="1" indent="-261720">
+            <a:pPr marL="723900" lvl="1" indent="-261620">
               <a:lnSpc>
                 <a:spcPct val="90000"/>
               </a:lnSpc>
@@ -5766,7 +5741,7 @@
           <a:fontRef idx="minor"/>
         </p:style>
         <p:txBody>
-          <a:bodyPr lIns="0" tIns="0" rIns="0" bIns="0"/>
+          <a:bodyPr lIns="0" tIns="0" rIns="0" bIns="0" anchor="t"/>
           <a:lstStyle/>
           <a:p>
             <a:pPr>
@@ -5780,12 +5755,16 @@
                 <a:spcPts val="283"/>
               </a:spcAft>
             </a:pPr>
-            <a:endParaRPr lang="en-US" sz="1800" b="0" strike="noStrike" spc="-1" dirty="0">
-              <a:latin typeface="Arial"/>
-            </a:endParaRPr>
-          </a:p>
-          <a:p>
-            <a:pPr marL="2160">
+            <a:endParaRPr lang="en-US" spc="-1" dirty="0">
+              <a:solidFill>
+                <a:srgbClr val="000000"/>
+              </a:solidFill>
+              <a:latin typeface="Calibri"/>
+              <a:ea typeface="DejaVu Sans"/>
+            </a:endParaRPr>
+          </a:p>
+          <a:p>
+            <a:pPr>
               <a:lnSpc>
                 <a:spcPct val="90000"/>
               </a:lnSpc>
@@ -5804,14 +5783,24 @@
                 <a:latin typeface="Calibri"/>
                 <a:ea typeface="DejaVu Sans"/>
               </a:rPr>
-              <a:t>Assume that you have been given the following questions for hypothesis testing.</a:t>
+              <a:t>Assume that you have been given the following questions.</a:t>
+            </a:r>
+            <a:r>
+              <a:rPr lang="en-US" spc="-1" dirty="0">
+                <a:solidFill>
+                  <a:srgbClr val="000000"/>
+                </a:solidFill>
+                <a:latin typeface="Calibri"/>
+                <a:ea typeface="DejaVu Sans"/>
+              </a:rPr>
+              <a:t> </a:t>
             </a:r>
             <a:endParaRPr lang="en-US" sz="1800" b="0" strike="noStrike" spc="-1" dirty="0">
               <a:latin typeface="Arial"/>
             </a:endParaRPr>
           </a:p>
           <a:p>
-            <a:pPr marL="612360" lvl="1" indent="-340920">
+            <a:pPr marL="612140" lvl="1" indent="-340360">
               <a:lnSpc>
                 <a:spcPct val="90000"/>
               </a:lnSpc>
@@ -5862,7 +5851,7 @@
             </a:endParaRPr>
           </a:p>
           <a:p>
-            <a:pPr marL="612360" lvl="1" indent="-340920">
+            <a:pPr marL="612140" lvl="1" indent="-340360">
               <a:lnSpc>
                 <a:spcPct val="90000"/>
               </a:lnSpc>
@@ -5879,6 +5868,16 @@
               <a:buAutoNum type="arabicPeriod"/>
             </a:pPr>
             <a:r>
+              <a:rPr lang="en-US" sz="1600" spc="-1" dirty="0">
+                <a:solidFill>
+                  <a:srgbClr val="000000"/>
+                </a:solidFill>
+                <a:latin typeface="Calibri"/>
+                <a:ea typeface="DejaVu Sans"/>
+              </a:rPr>
+              <a:t> </a:t>
+            </a:r>
+            <a:r>
               <a:rPr lang="en-US" sz="1600" b="0" strike="noStrike" spc="-1" dirty="0">
                 <a:solidFill>
                   <a:srgbClr val="000000"/>
@@ -5886,7 +5885,7 @@
                 <a:latin typeface="Calibri"/>
                 <a:ea typeface="DejaVu Sans"/>
               </a:rPr>
-              <a:t> Is there a significant difference in </a:t>
+              <a:t>Is there a significant difference in </a:t>
             </a:r>
             <a:r>
               <a:rPr lang="en-US" sz="1600" b="0" strike="noStrike" spc="-1" dirty="0" err="1">
@@ -5913,7 +5912,7 @@
             </a:endParaRPr>
           </a:p>
           <a:p>
-            <a:pPr marL="612360" lvl="1" indent="-340920">
+            <a:pPr marL="612140" lvl="1" indent="-340360">
               <a:lnSpc>
                 <a:spcPct val="90000"/>
               </a:lnSpc>
@@ -5944,7 +5943,7 @@
             </a:endParaRPr>
           </a:p>
           <a:p>
-            <a:pPr marL="612360" lvl="1" indent="-340920">
+            <a:pPr marL="612140" lvl="1" indent="-340360">
               <a:lnSpc>
                 <a:spcPct val="90000"/>
               </a:lnSpc>
@@ -5975,7 +5974,7 @@
             </a:endParaRPr>
           </a:p>
           <a:p>
-            <a:pPr marL="612360" lvl="1" indent="-340920">
+            <a:pPr marL="612140" lvl="1" indent="-340360">
               <a:lnSpc>
                 <a:spcPct val="90000"/>
               </a:lnSpc>
@@ -6019,14 +6018,24 @@
                 <a:latin typeface="Calibri"/>
                 <a:ea typeface="DejaVu Sans"/>
               </a:rPr>
-              <a:t> data set. </a:t>
+              <a:t> data set.</a:t>
+            </a:r>
+            <a:r>
+              <a:rPr lang="en-US" sz="1600" spc="-1" dirty="0">
+                <a:solidFill>
+                  <a:srgbClr val="000000"/>
+                </a:solidFill>
+                <a:latin typeface="Calibri"/>
+                <a:ea typeface="DejaVu Sans"/>
+              </a:rPr>
+              <a:t> </a:t>
             </a:r>
             <a:endParaRPr lang="en-US" sz="1600" b="0" strike="noStrike" spc="-1" dirty="0">
               <a:latin typeface="Arial"/>
             </a:endParaRPr>
           </a:p>
           <a:p>
-            <a:pPr marL="344880" indent="-340560">
+            <a:pPr marL="344805" indent="-340360">
               <a:lnSpc>
                 <a:spcPct val="90000"/>
               </a:lnSpc>
@@ -6057,7 +6066,7 @@
             </a:endParaRPr>
           </a:p>
           <a:p>
-            <a:pPr marL="344880" indent="-340560">
+            <a:pPr marL="344805" indent="-340360">
               <a:lnSpc>
                 <a:spcPct val="90000"/>
               </a:lnSpc>
@@ -6074,6 +6083,16 @@
               <a:buChar char="•"/>
             </a:pPr>
             <a:r>
+              <a:rPr lang="en-US" spc="-1" dirty="0">
+                <a:solidFill>
+                  <a:srgbClr val="000000"/>
+                </a:solidFill>
+                <a:latin typeface="Calibri"/>
+                <a:ea typeface="DejaVu Sans"/>
+              </a:rPr>
+              <a:t>Test</a:t>
+            </a:r>
+            <a:r>
               <a:rPr lang="en-US" sz="1800" b="0" strike="noStrike" spc="-1" dirty="0">
                 <a:solidFill>
                   <a:srgbClr val="000000"/>
@@ -6081,11 +6100,11 @@
                 <a:latin typeface="Calibri"/>
                 <a:ea typeface="DejaVu Sans"/>
               </a:rPr>
-              <a:t>Test your hypotheses using tests and modeling techniques from the course, based on the type of variables you have. Include tests of normality where appropriate.</a:t>
-            </a:r>
-          </a:p>
-          <a:p>
-            <a:pPr marL="344880" indent="-340560">
+              <a:t> your hypotheses using tests and modeling techniques from the course, based on the type of variables you have. Include tests of normality where appropriate.</a:t>
+            </a:r>
+          </a:p>
+          <a:p>
+            <a:pPr marL="344805" indent="-340360">
               <a:lnSpc>
                 <a:spcPct val="90000"/>
               </a:lnSpc>
@@ -6110,7 +6129,7 @@
             </a:endParaRPr>
           </a:p>
           <a:p>
-            <a:pPr marL="4320">
+            <a:pPr marL="3810">
               <a:lnSpc>
                 <a:spcPct val="90000"/>
               </a:lnSpc>

</xml_diff>